<commit_message>
Ardi: Se modifica presentación
</commit_message>
<xml_diff>
--- a/Presentacion- pre.pptx
+++ b/Presentacion- pre.pptx
@@ -6813,6 +6813,13 @@
   <p:clrMapOvr>
     <a:masterClrMapping/>
   </p:clrMapOvr>
+  <p:timing>
+    <p:tnLst>
+      <p:par>
+        <p:cTn id="1" dur="indefinite" restart="never" nodeType="tmRoot"/>
+      </p:par>
+    </p:tnLst>
+  </p:timing>
 </p:sld>
 </file>
 
@@ -7082,9 +7089,17 @@
               <a:rPr lang="es-CO" sz="6400" dirty="0"/>
               <a:t>BOGOTA D.C. 2019</a:t>
             </a:r>
+            <a:r>
+              <a:rPr lang="es-CO" sz="4000" dirty="0"/>
+              <a:t/>
+            </a:r>
             <a:br>
               <a:rPr lang="es-CO" sz="4000" dirty="0"/>
             </a:br>
+            <a:r>
+              <a:rPr lang="es-CO" sz="4000" dirty="0"/>
+              <a:t/>
+            </a:r>
             <a:br>
               <a:rPr lang="es-CO" sz="4000" dirty="0"/>
             </a:br>
@@ -7102,6 +7117,13 @@
   <p:clrMapOvr>
     <a:masterClrMapping/>
   </p:clrMapOvr>
+  <p:timing>
+    <p:tnLst>
+      <p:par>
+        <p:cTn id="1" dur="indefinite" restart="never" nodeType="tmRoot"/>
+      </p:par>
+    </p:tnLst>
+  </p:timing>
 </p:sld>
 </file>
 
@@ -7228,6 +7250,13 @@
   <p:clrMapOvr>
     <a:masterClrMapping/>
   </p:clrMapOvr>
+  <p:timing>
+    <p:tnLst>
+      <p:par>
+        <p:cTn id="1" dur="indefinite" restart="never" nodeType="tmRoot"/>
+      </p:par>
+    </p:tnLst>
+  </p:timing>
 </p:sld>
 </file>
 
@@ -7448,6 +7477,13 @@
   <p:clrMapOvr>
     <a:masterClrMapping/>
   </p:clrMapOvr>
+  <p:timing>
+    <p:tnLst>
+      <p:par>
+        <p:cTn id="1" dur="indefinite" restart="never" nodeType="tmRoot"/>
+      </p:par>
+    </p:tnLst>
+  </p:timing>
 </p:sld>
 </file>
 
@@ -7632,6 +7668,13 @@
   <p:clrMapOvr>
     <a:masterClrMapping/>
   </p:clrMapOvr>
+  <p:timing>
+    <p:tnLst>
+      <p:par>
+        <p:cTn id="1" dur="indefinite" restart="never" nodeType="tmRoot"/>
+      </p:par>
+    </p:tnLst>
+  </p:timing>
 </p:sld>
 </file>
 
@@ -7777,8 +7820,8 @@
           <p:nvPr/>
         </p:nvSpPr>
         <p:spPr>
-          <a:xfrm>
-            <a:off x="1057945" y="2044148"/>
+          <a:xfrm rot="786267">
+            <a:off x="926987" y="1758417"/>
             <a:ext cx="2703443" cy="2663687"/>
           </a:xfrm>
           <a:prstGeom prst="rightArrow">
@@ -7826,8 +7869,8 @@
           <p:nvPr/>
         </p:nvSpPr>
         <p:spPr>
-          <a:xfrm>
-            <a:off x="5382612" y="2150166"/>
+          <a:xfrm rot="20726925">
+            <a:off x="5330895" y="1837630"/>
             <a:ext cx="2703443" cy="2557669"/>
           </a:xfrm>
           <a:prstGeom prst="leftArrow">
@@ -7854,7 +7897,9 @@
           <a:p>
             <a:pPr algn="ctr"/>
             <a:r>
-              <a:rPr lang="es-ES" sz="2400" dirty="0"/>
+              <a:rPr lang="es-ES" sz="2400" dirty="0">
+                <a:hlinkClick r:id="rId3" action="ppaction://hlinkfile"/>
+              </a:rPr>
               <a:t>Salidas</a:t>
             </a:r>
             <a:endParaRPr lang="es-CO" sz="2400" dirty="0"/>
@@ -7863,23 +7908,18 @@
       </p:sp>
       <p:sp>
         <p:nvSpPr>
-          <p:cNvPr id="6" name="Trapecio 5">
+          <p:cNvPr id="8" name="Flecha abajo 7">
             <a:hlinkClick r:id="rId4" action="ppaction://hlinkfile"/>
-            <a:extLst>
-              <a:ext uri="{FF2B5EF4-FFF2-40B4-BE49-F238E27FC236}">
-                <a16:creationId xmlns:a16="http://schemas.microsoft.com/office/drawing/2014/main" id="{CDCBB027-FAE3-4D14-B5B1-59748275B5CA}"/>
-              </a:ext>
-            </a:extLst>
           </p:cNvPr>
           <p:cNvSpPr/>
           <p:nvPr/>
         </p:nvSpPr>
         <p:spPr>
           <a:xfrm>
-            <a:off x="3289519" y="4025581"/>
-            <a:ext cx="2564961" cy="2423036"/>
+            <a:off x="3343764" y="1302327"/>
+            <a:ext cx="2325515" cy="1956262"/>
           </a:xfrm>
-          <a:prstGeom prst="trapezoid">
+          <a:prstGeom prst="downArrow">
             <a:avLst/>
           </a:prstGeom>
         </p:spPr>
@@ -7903,10 +7943,106 @@
           <a:p>
             <a:pPr algn="ctr"/>
             <a:r>
-              <a:rPr lang="es-ES" sz="2400" dirty="0"/>
+              <a:rPr lang="es-MX" sz="2400" dirty="0" smtClean="0"/>
+              <a:t>Login</a:t>
+            </a:r>
+            <a:endParaRPr lang="es-419" sz="2400" dirty="0"/>
+          </a:p>
+        </p:txBody>
+      </p:sp>
+      <p:sp>
+        <p:nvSpPr>
+          <p:cNvPr id="9" name="Flecha arriba 8">
+            <a:hlinkClick r:id="rId5" action="ppaction://hlinkfile"/>
+          </p:cNvPr>
+          <p:cNvSpPr/>
+          <p:nvPr/>
+        </p:nvSpPr>
+        <p:spPr>
+          <a:xfrm rot="1519275">
+            <a:off x="1722816" y="4457140"/>
+            <a:ext cx="2697601" cy="2302625"/>
+          </a:xfrm>
+          <a:prstGeom prst="upArrow">
+            <a:avLst/>
+          </a:prstGeom>
+        </p:spPr>
+        <p:style>
+          <a:lnRef idx="1">
+            <a:schemeClr val="accent1"/>
+          </a:lnRef>
+          <a:fillRef idx="3">
+            <a:schemeClr val="accent1"/>
+          </a:fillRef>
+          <a:effectRef idx="2">
+            <a:schemeClr val="accent1"/>
+          </a:effectRef>
+          <a:fontRef idx="minor">
+            <a:schemeClr val="lt1"/>
+          </a:fontRef>
+        </p:style>
+        <p:txBody>
+          <a:bodyPr rtlCol="0" anchor="ctr"/>
+          <a:lstStyle/>
+          <a:p>
+            <a:pPr algn="ctr"/>
+            <a:r>
+              <a:rPr lang="es-MX" sz="2400" dirty="0" smtClean="0"/>
               <a:t>Reportes</a:t>
             </a:r>
-            <a:endParaRPr lang="es-CO" sz="2400" dirty="0"/>
+            <a:endParaRPr lang="es-419" sz="2400" dirty="0"/>
+          </a:p>
+        </p:txBody>
+      </p:sp>
+      <p:sp>
+        <p:nvSpPr>
+          <p:cNvPr id="10" name="Flecha arriba 9"/>
+          <p:cNvSpPr/>
+          <p:nvPr/>
+        </p:nvSpPr>
+        <p:spPr>
+          <a:xfrm rot="19096515">
+            <a:off x="4415895" y="4317730"/>
+            <a:ext cx="2697601" cy="2302625"/>
+          </a:xfrm>
+          <a:prstGeom prst="upArrow">
+            <a:avLst/>
+          </a:prstGeom>
+        </p:spPr>
+        <p:style>
+          <a:lnRef idx="1">
+            <a:schemeClr val="accent1"/>
+          </a:lnRef>
+          <a:fillRef idx="3">
+            <a:schemeClr val="accent1"/>
+          </a:fillRef>
+          <a:effectRef idx="2">
+            <a:schemeClr val="accent1"/>
+          </a:effectRef>
+          <a:fontRef idx="minor">
+            <a:schemeClr val="lt1"/>
+          </a:fontRef>
+        </p:style>
+        <p:txBody>
+          <a:bodyPr rtlCol="0" anchor="ctr"/>
+          <a:lstStyle/>
+          <a:p>
+            <a:pPr algn="ctr"/>
+            <a:r>
+              <a:rPr lang="es-MX" sz="2400" dirty="0" smtClean="0">
+                <a:hlinkClick r:id="rId6" action="ppaction://hlinkfile"/>
+              </a:rPr>
+              <a:t>Reportes</a:t>
+            </a:r>
+            <a:endParaRPr lang="es-MX" sz="2400" dirty="0" smtClean="0"/>
+          </a:p>
+          <a:p>
+            <a:pPr algn="ctr"/>
+            <a:r>
+              <a:rPr lang="es-MX" sz="2400" dirty="0" smtClean="0"/>
+              <a:t>mensuales</a:t>
+            </a:r>
+            <a:endParaRPr lang="es-419" sz="2400" dirty="0"/>
           </a:p>
         </p:txBody>
       </p:sp>
@@ -7920,6 +8056,13 @@
   <p:clrMapOvr>
     <a:masterClrMapping/>
   </p:clrMapOvr>
+  <p:timing>
+    <p:tnLst>
+      <p:par>
+        <p:cTn id="1" dur="indefinite" restart="never" nodeType="tmRoot"/>
+      </p:par>
+    </p:tnLst>
+  </p:timing>
 </p:sld>
 </file>
 
@@ -7997,6 +8140,13 @@
   <p:clrMapOvr>
     <a:masterClrMapping/>
   </p:clrMapOvr>
+  <p:timing>
+    <p:tnLst>
+      <p:par>
+        <p:cTn id="1" dur="indefinite" restart="never" nodeType="tmRoot"/>
+      </p:par>
+    </p:tnLst>
+  </p:timing>
 </p:sld>
 </file>
 

</xml_diff>

<commit_message>
Se corrige la presentación
</commit_message>
<xml_diff>
--- a/Presentacion- pre.pptx
+++ b/Presentacion- pre.pptx
@@ -231,7 +231,7 @@
           <a:p>
             <a:fld id="{4E4206E0-8F38-491F-8DD8-9DEF31DAB11E}" type="datetimeFigureOut">
               <a:rPr lang="es-CO" smtClean="0"/>
-              <a:t>6/09/2019</a:t>
+              <a:t>12/09/2019</a:t>
             </a:fld>
             <a:endParaRPr lang="es-CO"/>
           </a:p>
@@ -396,7 +396,7 @@
           <a:p>
             <a:fld id="{AE7E15B5-955E-4B5B-9E1F-B3C4B4C6AE0C}" type="datetimeFigureOut">
               <a:rPr lang="es-CO" smtClean="0"/>
-              <a:t>6/09/2019</a:t>
+              <a:t>12/09/2019</a:t>
             </a:fld>
             <a:endParaRPr lang="es-CO"/>
           </a:p>
@@ -737,7 +737,7 @@
           <a:p>
             <a:fld id="{483D03DC-5ED8-7A42-A55E-C10C004AFC42}" type="datetimeFigureOut">
               <a:rPr lang="es-ES" smtClean="0"/>
-              <a:t>06/09/2019</a:t>
+              <a:t>12/09/2019</a:t>
             </a:fld>
             <a:endParaRPr lang="es-ES"/>
           </a:p>
@@ -1406,7 +1406,7 @@
           <a:p>
             <a:fld id="{483D03DC-5ED8-7A42-A55E-C10C004AFC42}" type="datetimeFigureOut">
               <a:rPr lang="es-ES" smtClean="0"/>
-              <a:t>06/09/2019</a:t>
+              <a:t>12/09/2019</a:t>
             </a:fld>
             <a:endParaRPr lang="es-ES" dirty="0"/>
           </a:p>
@@ -1565,7 +1565,7 @@
           <a:p>
             <a:fld id="{483D03DC-5ED8-7A42-A55E-C10C004AFC42}" type="datetimeFigureOut">
               <a:rPr lang="es-ES" smtClean="0"/>
-              <a:t>06/09/2019</a:t>
+              <a:t>12/09/2019</a:t>
             </a:fld>
             <a:endParaRPr lang="es-ES"/>
           </a:p>
@@ -2095,7 +2095,7 @@
           <a:p>
             <a:fld id="{483D03DC-5ED8-7A42-A55E-C10C004AFC42}" type="datetimeFigureOut">
               <a:rPr lang="es-ES" smtClean="0"/>
-              <a:t>06/09/2019</a:t>
+              <a:t>12/09/2019</a:t>
             </a:fld>
             <a:endParaRPr lang="es-ES"/>
           </a:p>
@@ -2628,7 +2628,7 @@
           <a:p>
             <a:fld id="{483D03DC-5ED8-7A42-A55E-C10C004AFC42}" type="datetimeFigureOut">
               <a:rPr lang="es-ES" smtClean="0"/>
-              <a:t>06/09/2019</a:t>
+              <a:t>12/09/2019</a:t>
             </a:fld>
             <a:endParaRPr lang="es-ES"/>
           </a:p>
@@ -2858,7 +2858,7 @@
           <a:p>
             <a:fld id="{483D03DC-5ED8-7A42-A55E-C10C004AFC42}" type="datetimeFigureOut">
               <a:rPr lang="es-ES" smtClean="0"/>
-              <a:t>06/09/2019</a:t>
+              <a:t>12/09/2019</a:t>
             </a:fld>
             <a:endParaRPr lang="es-ES"/>
           </a:p>
@@ -3536,7 +3536,7 @@
           <a:p>
             <a:fld id="{483D03DC-5ED8-7A42-A55E-C10C004AFC42}" type="datetimeFigureOut">
               <a:rPr lang="es-ES" smtClean="0"/>
-              <a:t>06/09/2019</a:t>
+              <a:t>12/09/2019</a:t>
             </a:fld>
             <a:endParaRPr lang="es-ES" dirty="0"/>
           </a:p>
@@ -3631,7 +3631,7 @@
           <a:p>
             <a:fld id="{483D03DC-5ED8-7A42-A55E-C10C004AFC42}" type="datetimeFigureOut">
               <a:rPr lang="es-ES" smtClean="0"/>
-              <a:t>06/09/2019</a:t>
+              <a:t>12/09/2019</a:t>
             </a:fld>
             <a:endParaRPr lang="es-ES"/>
           </a:p>
@@ -4176,7 +4176,7 @@
           <a:p>
             <a:fld id="{483D03DC-5ED8-7A42-A55E-C10C004AFC42}" type="datetimeFigureOut">
               <a:rPr lang="es-ES" smtClean="0"/>
-              <a:t>06/09/2019</a:t>
+              <a:t>12/09/2019</a:t>
             </a:fld>
             <a:endParaRPr lang="es-ES"/>
           </a:p>
@@ -5093,7 +5093,7 @@
           <a:p>
             <a:fld id="{483D03DC-5ED8-7A42-A55E-C10C004AFC42}" type="datetimeFigureOut">
               <a:rPr lang="es-ES" smtClean="0"/>
-              <a:t>06/09/2019</a:t>
+              <a:t>12/09/2019</a:t>
             </a:fld>
             <a:endParaRPr lang="es-ES" dirty="0"/>
           </a:p>
@@ -5252,7 +5252,7 @@
           <a:p>
             <a:fld id="{483D03DC-5ED8-7A42-A55E-C10C004AFC42}" type="datetimeFigureOut">
               <a:rPr lang="es-ES" smtClean="0"/>
-              <a:t>06/09/2019</a:t>
+              <a:t>12/09/2019</a:t>
             </a:fld>
             <a:endParaRPr lang="es-ES"/>
           </a:p>
@@ -5782,7 +5782,7 @@
           <a:p>
             <a:fld id="{483D03DC-5ED8-7A42-A55E-C10C004AFC42}" type="datetimeFigureOut">
               <a:rPr lang="es-ES" smtClean="0"/>
-              <a:t>06/09/2019</a:t>
+              <a:t>12/09/2019</a:t>
             </a:fld>
             <a:endParaRPr lang="es-ES"/>
           </a:p>
@@ -6341,7 +6341,7 @@
           <a:p>
             <a:fld id="{483D03DC-5ED8-7A42-A55E-C10C004AFC42}" type="datetimeFigureOut">
               <a:rPr lang="es-ES" smtClean="0"/>
-              <a:t>06/09/2019</a:t>
+              <a:t>12/09/2019</a:t>
             </a:fld>
             <a:endParaRPr lang="es-ES"/>
           </a:p>
@@ -7630,28 +7630,28 @@
       </p:sp>
       <p:pic>
         <p:nvPicPr>
-          <p:cNvPr id="4" name="Imagen 3">
-            <a:extLst>
-              <a:ext uri="{FF2B5EF4-FFF2-40B4-BE49-F238E27FC236}">
-                <a16:creationId xmlns:a16="http://schemas.microsoft.com/office/drawing/2014/main" id="{A7E17B2A-1D4B-4773-AF82-39D8C2FA868A}"/>
-              </a:ext>
-            </a:extLst>
-          </p:cNvPr>
+          <p:cNvPr id="5" name="Imagen 4"/>
           <p:cNvPicPr>
             <a:picLocks noChangeAspect="1"/>
           </p:cNvPicPr>
           <p:nvPr/>
         </p:nvPicPr>
         <p:blipFill>
-          <a:blip r:embed="rId3"/>
+          <a:blip r:embed="rId3">
+            <a:extLst>
+              <a:ext uri="{28A0092B-C50C-407E-A947-70E740481C1C}">
+                <a14:useLocalDpi xmlns:a14="http://schemas.microsoft.com/office/drawing/2010/main" val="0"/>
+              </a:ext>
+            </a:extLst>
+          </a:blip>
           <a:stretch>
             <a:fillRect/>
           </a:stretch>
         </p:blipFill>
         <p:spPr>
           <a:xfrm>
-            <a:off x="430698" y="1426946"/>
-            <a:ext cx="7560364" cy="5003556"/>
+            <a:off x="788276" y="1282262"/>
+            <a:ext cx="7527499" cy="5158478"/>
           </a:xfrm>
           <a:prstGeom prst="rect">
             <a:avLst/>

</xml_diff>